<commit_message>
added final changes to slides and code
</commit_message>
<xml_diff>
--- a/Rcpp/Rcpp.pptx
+++ b/Rcpp/Rcpp.pptx
@@ -5,7 +5,7 @@
     <p:sldMasterId id="2147483648" r:id="rId1"/>
   </p:sldMasterIdLst>
   <p:notesMasterIdLst>
-    <p:notesMasterId r:id="rId22"/>
+    <p:notesMasterId r:id="rId23"/>
   </p:notesMasterIdLst>
   <p:sldIdLst>
     <p:sldId id="256" r:id="rId2"/>
@@ -24,10 +24,11 @@
     <p:sldId id="272" r:id="rId15"/>
     <p:sldId id="285" r:id="rId16"/>
     <p:sldId id="275" r:id="rId17"/>
-    <p:sldId id="286" r:id="rId18"/>
-    <p:sldId id="277" r:id="rId19"/>
-    <p:sldId id="278" r:id="rId20"/>
-    <p:sldId id="276" r:id="rId21"/>
+    <p:sldId id="287" r:id="rId18"/>
+    <p:sldId id="286" r:id="rId19"/>
+    <p:sldId id="277" r:id="rId20"/>
+    <p:sldId id="278" r:id="rId21"/>
+    <p:sldId id="276" r:id="rId22"/>
   </p:sldIdLst>
   <p:sldSz cx="12192000" cy="6858000"/>
   <p:notesSz cx="6858000" cy="9144000"/>
@@ -216,7 +217,7 @@
           <a:p>
             <a:fld id="{E684D33E-0FCA-415A-B2F9-6E6359F281E1}" type="datetimeFigureOut">
               <a:rPr lang="en-US" smtClean="0"/>
-              <a:t>5/1/2018</a:t>
+              <a:t>5/3/2018</a:t>
             </a:fld>
             <a:endParaRPr lang="en-US"/>
           </a:p>
@@ -701,7 +702,7 @@
           <a:p>
             <a:fld id="{AE656979-C36E-4BA9-A4B1-EC21EE7E706F}" type="datetime1">
               <a:rPr lang="en-US" smtClean="0"/>
-              <a:t>5/1/2018</a:t>
+              <a:t>5/3/2018</a:t>
             </a:fld>
             <a:endParaRPr lang="en-US"/>
           </a:p>
@@ -872,7 +873,7 @@
           <a:p>
             <a:fld id="{3E6A666C-53C7-4A9C-9F15-DFD01072818E}" type="datetime1">
               <a:rPr lang="en-US" smtClean="0"/>
-              <a:t>5/1/2018</a:t>
+              <a:t>5/3/2018</a:t>
             </a:fld>
             <a:endParaRPr lang="en-US"/>
           </a:p>
@@ -1053,7 +1054,7 @@
           <a:p>
             <a:fld id="{7C6136E2-67F2-4673-B6F7-663CA123B9F4}" type="datetime1">
               <a:rPr lang="en-US" smtClean="0"/>
-              <a:t>5/1/2018</a:t>
+              <a:t>5/3/2018</a:t>
             </a:fld>
             <a:endParaRPr lang="en-US"/>
           </a:p>
@@ -1229,7 +1230,7 @@
           <a:p>
             <a:fld id="{F332E968-AA24-423C-8EC5-DEFA5295567A}" type="datetime1">
               <a:rPr lang="en-US" smtClean="0"/>
-              <a:t>5/1/2018</a:t>
+              <a:t>5/3/2018</a:t>
             </a:fld>
             <a:endParaRPr lang="en-US"/>
           </a:p>
@@ -1477,7 +1478,7 @@
           <a:p>
             <a:fld id="{17F56CE7-88A5-4669-93CA-1C063DE4B7F5}" type="datetime1">
               <a:rPr lang="en-US" smtClean="0"/>
-              <a:t>5/1/2018</a:t>
+              <a:t>5/3/2018</a:t>
             </a:fld>
             <a:endParaRPr lang="en-US"/>
           </a:p>
@@ -1709,7 +1710,7 @@
           <a:p>
             <a:fld id="{C0FD6F4C-6899-406E-908C-FEF792832B17}" type="datetime1">
               <a:rPr lang="en-US" smtClean="0"/>
-              <a:t>5/1/2018</a:t>
+              <a:t>5/3/2018</a:t>
             </a:fld>
             <a:endParaRPr lang="en-US"/>
           </a:p>
@@ -2076,7 +2077,7 @@
           <a:p>
             <a:fld id="{3C2C5880-D295-4B5C-9C4F-3DADC9619DA8}" type="datetime1">
               <a:rPr lang="en-US" smtClean="0"/>
-              <a:t>5/1/2018</a:t>
+              <a:t>5/3/2018</a:t>
             </a:fld>
             <a:endParaRPr lang="en-US"/>
           </a:p>
@@ -2202,7 +2203,7 @@
           <a:p>
             <a:fld id="{BFBBD99B-E235-44AE-8AE5-9058D9028A1F}" type="datetime1">
               <a:rPr lang="en-US" smtClean="0"/>
-              <a:t>5/1/2018</a:t>
+              <a:t>5/3/2018</a:t>
             </a:fld>
             <a:endParaRPr lang="en-US"/>
           </a:p>
@@ -2305,7 +2306,7 @@
           <a:p>
             <a:fld id="{AFDBD8FD-EE58-4FCF-A3FE-1155F20F4CD9}" type="datetime1">
               <a:rPr lang="en-US" smtClean="0"/>
-              <a:t>5/1/2018</a:t>
+              <a:t>5/3/2018</a:t>
             </a:fld>
             <a:endParaRPr lang="en-US"/>
           </a:p>
@@ -2583,7 +2584,7 @@
           <a:p>
             <a:fld id="{C0F853F4-7278-41F4-BE55-B385DED9D7EF}" type="datetime1">
               <a:rPr lang="en-US" smtClean="0"/>
-              <a:t>5/1/2018</a:t>
+              <a:t>5/3/2018</a:t>
             </a:fld>
             <a:endParaRPr lang="en-US"/>
           </a:p>
@@ -2838,7 +2839,7 @@
           <a:p>
             <a:fld id="{4AFF14FC-AB05-4D34-81EB-83C0AD7AD874}" type="datetime1">
               <a:rPr lang="en-US" smtClean="0"/>
-              <a:t>5/1/2018</a:t>
+              <a:t>5/3/2018</a:t>
             </a:fld>
             <a:endParaRPr lang="en-US"/>
           </a:p>
@@ -3052,7 +3053,7 @@
           <a:p>
             <a:fld id="{261C3C18-719B-40C1-83B9-66F04181DE45}" type="datetime1">
               <a:rPr lang="en-US" smtClean="0"/>
-              <a:t>5/1/2018</a:t>
+              <a:t>5/3/2018</a:t>
             </a:fld>
             <a:endParaRPr lang="en-US"/>
           </a:p>
@@ -3851,7 +3852,7 @@
           <a:p>
             <a:r>
               <a:rPr lang="en-US" dirty="0"/>
-              <a:t>Use R 3.4+</a:t>
+              <a:t>Use R 3.4+ (reason: bytecode)</a:t>
             </a:r>
           </a:p>
           <a:p>
@@ -3860,36 +3861,20 @@
           <a:p>
             <a:r>
               <a:rPr lang="en-US" dirty="0"/>
-              <a:t>ALTREP</a:t>
-            </a:r>
-          </a:p>
-          <a:p>
+              <a:t>R 3.5 just landed; upgrade (reason: ALTREP)</a:t>
+            </a:r>
+          </a:p>
+          <a:p>
+            <a:pPr marL="0" indent="0">
+              <a:buNone/>
+            </a:pPr>
             <a:endParaRPr lang="en-US" dirty="0"/>
           </a:p>
           <a:p>
             <a:r>
-              <a:rPr lang="en-US" dirty="0" err="1">
-                <a:solidFill>
-                  <a:schemeClr val="accent1"/>
-                </a:solidFill>
-              </a:rPr>
-              <a:t>microbenchmark</a:t>
-            </a:r>
-            <a:endParaRPr lang="en-US" dirty="0">
-              <a:solidFill>
-                <a:schemeClr val="accent1"/>
-              </a:solidFill>
-            </a:endParaRPr>
-          </a:p>
-          <a:p>
-            <a:endParaRPr lang="en-US" dirty="0"/>
-          </a:p>
-          <a:p>
-            <a:r>
-              <a:rPr lang="en-US" dirty="0" err="1"/>
-              <a:t>Vectorize</a:t>
-            </a:r>
-            <a:endParaRPr lang="en-US" dirty="0"/>
+              <a:rPr lang="en-US" dirty="0"/>
+              <a:t>Vectorize (reason: everyone is doing it)</a:t>
+            </a:r>
           </a:p>
           <a:p>
             <a:pPr marL="0" indent="0">
@@ -4595,40 +4580,134 @@
         </p:nvSpPr>
         <p:spPr>
           <a:xfrm>
-            <a:off x="838200" y="2554533"/>
+            <a:off x="692426" y="1598634"/>
+            <a:ext cx="10515600" cy="4457612"/>
+          </a:xfrm>
+        </p:spPr>
+        <p:txBody>
+          <a:bodyPr>
+            <a:normAutofit/>
+          </a:bodyPr>
+          <a:lstStyle/>
+          <a:p>
+            <a:r>
+              <a:rPr lang="en-US" dirty="0"/>
+              <a:t>- </a:t>
+            </a:r>
+            <a:r>
+              <a:rPr lang="en-US" sz="3600" dirty="0"/>
+              <a:t>Write R functions for repetitive tasks</a:t>
+            </a:r>
+            <a:br>
+              <a:rPr lang="en-US" sz="3600" dirty="0"/>
+            </a:br>
+            <a:br>
+              <a:rPr lang="en-US" sz="3600" dirty="0"/>
+            </a:br>
+            <a:r>
+              <a:rPr lang="en-US" sz="3600" dirty="0"/>
+              <a:t>- Profile if slow</a:t>
+            </a:r>
+            <a:br>
+              <a:rPr lang="en-US" sz="3600" dirty="0"/>
+            </a:br>
+            <a:br>
+              <a:rPr lang="en-US" sz="3600" dirty="0"/>
+            </a:br>
+            <a:r>
+              <a:rPr lang="en-US" sz="3600" dirty="0"/>
+              <a:t>- Note types </a:t>
+            </a:r>
+            <a:br>
+              <a:rPr lang="en-US" sz="3600" dirty="0"/>
+            </a:br>
+            <a:br>
+              <a:rPr lang="en-US" sz="3600" dirty="0"/>
+            </a:br>
+            <a:r>
+              <a:rPr lang="en-US" sz="3600" dirty="0"/>
+              <a:t>- Translate it into </a:t>
+            </a:r>
+            <a:r>
+              <a:rPr lang="en-US" sz="3600" dirty="0" err="1"/>
+              <a:t>Rcpp</a:t>
+            </a:r>
+            <a:endParaRPr lang="en-US" sz="3600" dirty="0"/>
+          </a:p>
+        </p:txBody>
+      </p:sp>
+      <p:sp>
+        <p:nvSpPr>
+          <p:cNvPr id="4" name="Footer Placeholder 3"/>
+          <p:cNvSpPr>
+            <a:spLocks noGrp="1"/>
+          </p:cNvSpPr>
+          <p:nvPr>
+            <p:ph type="ftr" sz="quarter" idx="11"/>
+          </p:nvPr>
+        </p:nvSpPr>
+        <p:spPr/>
+        <p:txBody>
+          <a:bodyPr/>
+          <a:lstStyle/>
+          <a:p>
+            <a:r>
+              <a:rPr lang="en-US"/>
+              <a:t>https://github.com/pgurazada</a:t>
+            </a:r>
+          </a:p>
+        </p:txBody>
+      </p:sp>
+      <p:sp>
+        <p:nvSpPr>
+          <p:cNvPr id="5" name="Title 1">
+            <a:extLst>
+              <a:ext uri="{FF2B5EF4-FFF2-40B4-BE49-F238E27FC236}">
+                <a16:creationId xmlns:a16="http://schemas.microsoft.com/office/drawing/2014/main" id="{F7B4696E-9A94-4502-BC67-58E21E8D62C8}"/>
+              </a:ext>
+            </a:extLst>
+          </p:cNvPr>
+          <p:cNvSpPr txBox="1">
+            <a:spLocks/>
+          </p:cNvSpPr>
+          <p:nvPr/>
+        </p:nvSpPr>
+        <p:spPr>
+          <a:xfrm>
+            <a:off x="838200" y="365125"/>
             <a:ext cx="10515600" cy="1325563"/>
           </a:xfrm>
+          <a:prstGeom prst="rect">
+            <a:avLst/>
+          </a:prstGeom>
         </p:spPr>
         <p:txBody>
-          <a:bodyPr/>
-          <a:lstStyle/>
-          <a:p>
-            <a:pPr algn="ctr"/>
+          <a:bodyPr vert="horz" lIns="91440" tIns="45720" rIns="91440" bIns="45720" rtlCol="0" anchor="ctr">
+            <a:normAutofit/>
+          </a:bodyPr>
+          <a:lstStyle>
+            <a:lvl1pPr algn="l" defTabSz="914400" rtl="0" eaLnBrk="1" latinLnBrk="0" hangingPunct="1">
+              <a:lnSpc>
+                <a:spcPct val="90000"/>
+              </a:lnSpc>
+              <a:spcBef>
+                <a:spcPct val="0"/>
+              </a:spcBef>
+              <a:buNone/>
+              <a:defRPr sz="4400" kern="1200">
+                <a:solidFill>
+                  <a:schemeClr val="tx1"/>
+                </a:solidFill>
+                <a:latin typeface="Consolas" panose="020B0609020204030204" pitchFamily="49" charset="0"/>
+                <a:ea typeface="+mj-ea"/>
+                <a:cs typeface="+mj-cs"/>
+              </a:defRPr>
+            </a:lvl1pPr>
+          </a:lstStyle>
+          <a:p>
             <a:r>
               <a:rPr lang="en-US" dirty="0"/>
-              <a:t>I promise… No pointers</a:t>
-            </a:r>
-          </a:p>
-        </p:txBody>
-      </p:sp>
-      <p:sp>
-        <p:nvSpPr>
-          <p:cNvPr id="4" name="Footer Placeholder 3"/>
-          <p:cNvSpPr>
-            <a:spLocks noGrp="1"/>
-          </p:cNvSpPr>
-          <p:nvPr>
-            <p:ph type="ftr" sz="quarter" idx="11"/>
-          </p:nvPr>
-        </p:nvSpPr>
-        <p:spPr/>
-        <p:txBody>
-          <a:bodyPr/>
-          <a:lstStyle/>
-          <a:p>
-            <a:r>
-              <a:rPr lang="en-US"/>
-              <a:t>https://github.com/pgurazada</a:t>
+              <a:t>A typical workflow</a:t>
             </a:r>
           </a:p>
         </p:txBody>
@@ -4647,6 +4726,205 @@
 </file>
 
 <file path=ppt/slides/slide17.xml><?xml version="1.0" encoding="utf-8"?>
+<p:sld xmlns:a="http://schemas.openxmlformats.org/drawingml/2006/main" xmlns:r="http://schemas.openxmlformats.org/officeDocument/2006/relationships" xmlns:p="http://schemas.openxmlformats.org/presentationml/2006/main">
+  <p:cSld>
+    <p:spTree>
+      <p:nvGrpSpPr>
+        <p:cNvPr id="1" name=""/>
+        <p:cNvGrpSpPr/>
+        <p:nvPr/>
+      </p:nvGrpSpPr>
+      <p:grpSpPr>
+        <a:xfrm>
+          <a:off x="0" y="0"/>
+          <a:ext cx="0" cy="0"/>
+          <a:chOff x="0" y="0"/>
+          <a:chExt cx="0" cy="0"/>
+        </a:xfrm>
+      </p:grpSpPr>
+      <p:sp>
+        <p:nvSpPr>
+          <p:cNvPr id="2" name="Title 1">
+            <a:extLst>
+              <a:ext uri="{FF2B5EF4-FFF2-40B4-BE49-F238E27FC236}">
+                <a16:creationId xmlns:a16="http://schemas.microsoft.com/office/drawing/2014/main" id="{29875186-60AC-48A9-8E6A-33E8A57FC427}"/>
+              </a:ext>
+            </a:extLst>
+          </p:cNvPr>
+          <p:cNvSpPr>
+            <a:spLocks noGrp="1"/>
+          </p:cNvSpPr>
+          <p:nvPr>
+            <p:ph type="title"/>
+          </p:nvPr>
+        </p:nvSpPr>
+        <p:spPr/>
+        <p:txBody>
+          <a:bodyPr/>
+          <a:lstStyle/>
+          <a:p>
+            <a:r>
+              <a:rPr lang="en-US" dirty="0"/>
+              <a:t>Implementing multi-armed bandits</a:t>
+            </a:r>
+          </a:p>
+        </p:txBody>
+      </p:sp>
+      <p:sp>
+        <p:nvSpPr>
+          <p:cNvPr id="4" name="Footer Placeholder 3">
+            <a:extLst>
+              <a:ext uri="{FF2B5EF4-FFF2-40B4-BE49-F238E27FC236}">
+                <a16:creationId xmlns:a16="http://schemas.microsoft.com/office/drawing/2014/main" id="{300A02CB-59A6-4AB3-9DB2-A1E40EFF29A1}"/>
+              </a:ext>
+            </a:extLst>
+          </p:cNvPr>
+          <p:cNvSpPr>
+            <a:spLocks noGrp="1"/>
+          </p:cNvSpPr>
+          <p:nvPr>
+            <p:ph type="ftr" sz="quarter" idx="11"/>
+          </p:nvPr>
+        </p:nvSpPr>
+        <p:spPr/>
+        <p:txBody>
+          <a:bodyPr/>
+          <a:lstStyle/>
+          <a:p>
+            <a:r>
+              <a:rPr lang="en-US"/>
+              <a:t>https://github.com/pgurazada</a:t>
+            </a:r>
+          </a:p>
+        </p:txBody>
+      </p:sp>
+      <p:pic>
+        <p:nvPicPr>
+          <p:cNvPr id="1026" name="Picture 2" descr="https://blogs.mathworks.com/images/loren/2016/multiarmedbandit.jpg">
+            <a:extLst>
+              <a:ext uri="{FF2B5EF4-FFF2-40B4-BE49-F238E27FC236}">
+                <a16:creationId xmlns:a16="http://schemas.microsoft.com/office/drawing/2014/main" id="{3E224B6C-E68D-4242-9D68-A6D9EBBF505D}"/>
+              </a:ext>
+            </a:extLst>
+          </p:cNvPr>
+          <p:cNvPicPr>
+            <a:picLocks noChangeAspect="1" noChangeArrowheads="1"/>
+          </p:cNvPicPr>
+          <p:nvPr/>
+        </p:nvPicPr>
+        <p:blipFill>
+          <a:blip r:embed="rId2">
+            <a:extLst>
+              <a:ext uri="{28A0092B-C50C-407E-A947-70E740481C1C}">
+                <a14:useLocalDpi xmlns:a14="http://schemas.microsoft.com/office/drawing/2010/main" val="0"/>
+              </a:ext>
+            </a:extLst>
+          </a:blip>
+          <a:srcRect/>
+          <a:stretch>
+            <a:fillRect/>
+          </a:stretch>
+        </p:blipFill>
+        <p:spPr bwMode="auto">
+          <a:xfrm>
+            <a:off x="1150454" y="2411689"/>
+            <a:ext cx="3149976" cy="2610886"/>
+          </a:xfrm>
+          <a:prstGeom prst="rect">
+            <a:avLst/>
+          </a:prstGeom>
+          <a:noFill/>
+          <a:extLst>
+            <a:ext uri="{909E8E84-426E-40DD-AFC4-6F175D3DCCD1}">
+              <a14:hiddenFill xmlns:a14="http://schemas.microsoft.com/office/drawing/2010/main">
+                <a:solidFill>
+                  <a:srgbClr val="FFFFFF"/>
+                </a:solidFill>
+              </a14:hiddenFill>
+            </a:ext>
+          </a:extLst>
+        </p:spPr>
+      </p:pic>
+      <p:pic>
+        <p:nvPicPr>
+          <p:cNvPr id="5" name="Picture 4">
+            <a:extLst>
+              <a:ext uri="{FF2B5EF4-FFF2-40B4-BE49-F238E27FC236}">
+                <a16:creationId xmlns:a16="http://schemas.microsoft.com/office/drawing/2014/main" id="{8DA7C43C-80D9-4C7F-8231-E4C54A772744}"/>
+              </a:ext>
+            </a:extLst>
+          </p:cNvPr>
+          <p:cNvPicPr>
+            <a:picLocks noChangeAspect="1"/>
+          </p:cNvPicPr>
+          <p:nvPr/>
+        </p:nvPicPr>
+        <p:blipFill rotWithShape="1">
+          <a:blip r:embed="rId3"/>
+          <a:srcRect l="29266" t="23950" r="26848" b="24818"/>
+          <a:stretch/>
+        </p:blipFill>
+        <p:spPr>
+          <a:xfrm>
+            <a:off x="6003235" y="2014330"/>
+            <a:ext cx="5350565" cy="3511724"/>
+          </a:xfrm>
+          <a:prstGeom prst="rect">
+            <a:avLst/>
+          </a:prstGeom>
+        </p:spPr>
+      </p:pic>
+      <p:sp>
+        <p:nvSpPr>
+          <p:cNvPr id="6" name="TextBox 5">
+            <a:extLst>
+              <a:ext uri="{FF2B5EF4-FFF2-40B4-BE49-F238E27FC236}">
+                <a16:creationId xmlns:a16="http://schemas.microsoft.com/office/drawing/2014/main" id="{E62B2D02-C169-4CB6-B0B5-D46FEDF482B3}"/>
+              </a:ext>
+            </a:extLst>
+          </p:cNvPr>
+          <p:cNvSpPr txBox="1"/>
+          <p:nvPr/>
+        </p:nvSpPr>
+        <p:spPr>
+          <a:xfrm>
+            <a:off x="8865704" y="5526054"/>
+            <a:ext cx="2633870" cy="307777"/>
+          </a:xfrm>
+          <a:prstGeom prst="rect">
+            <a:avLst/>
+          </a:prstGeom>
+          <a:noFill/>
+        </p:spPr>
+        <p:txBody>
+          <a:bodyPr wrap="square" rtlCol="0">
+            <a:spAutoFit/>
+          </a:bodyPr>
+          <a:lstStyle/>
+          <a:p>
+            <a:r>
+              <a:rPr lang="en-US" sz="1400" dirty="0">
+                <a:latin typeface="Consolas" panose="020B0609020204030204" pitchFamily="49" charset="0"/>
+              </a:rPr>
+              <a:t>(John Myles White, 2013)</a:t>
+            </a:r>
+          </a:p>
+        </p:txBody>
+      </p:sp>
+    </p:spTree>
+    <p:extLst>
+      <p:ext uri="{BB962C8B-B14F-4D97-AF65-F5344CB8AC3E}">
+        <p14:creationId xmlns:p14="http://schemas.microsoft.com/office/powerpoint/2010/main" val="2778819878"/>
+      </p:ext>
+    </p:extLst>
+  </p:cSld>
+  <p:clrMapOvr>
+    <a:masterClrMapping/>
+  </p:clrMapOvr>
+</p:sld>
+</file>
+
+<file path=ppt/slides/slide18.xml><?xml version="1.0" encoding="utf-8"?>
 <p:sld xmlns:a="http://schemas.openxmlformats.org/drawingml/2006/main" xmlns:r="http://schemas.openxmlformats.org/officeDocument/2006/relationships" xmlns:p="http://schemas.openxmlformats.org/presentationml/2006/main">
   <p:cSld>
     <p:bg>
@@ -4873,7 +5151,7 @@
 </p:sld>
 </file>
 
-<file path=ppt/slides/slide18.xml><?xml version="1.0" encoding="utf-8"?>
+<file path=ppt/slides/slide19.xml><?xml version="1.0" encoding="utf-8"?>
 <p:sld xmlns:a="http://schemas.openxmlformats.org/drawingml/2006/main" xmlns:r="http://schemas.openxmlformats.org/officeDocument/2006/relationships" xmlns:p="http://schemas.openxmlformats.org/presentationml/2006/main">
   <p:cSld>
     <p:spTree>
@@ -4895,7 +5173,7 @@
           <p:cNvPr id="2" name="Title 1">
             <a:extLst>
               <a:ext uri="{FF2B5EF4-FFF2-40B4-BE49-F238E27FC236}">
-                <a16:creationId xmlns:a16="http://schemas.microsoft.com/office/drawing/2014/main" xmlns="" id="{AB95B45E-073C-4360-86D5-F13E1209ED3A}"/>
+                <a16:creationId xmlns:a16="http://schemas.microsoft.com/office/drawing/2014/main" id="{AB95B45E-073C-4360-86D5-F13E1209ED3A}"/>
               </a:ext>
             </a:extLst>
           </p:cNvPr>
@@ -4928,7 +5206,7 @@
           <p:cNvPr id="4" name="Footer Placeholder 3">
             <a:extLst>
               <a:ext uri="{FF2B5EF4-FFF2-40B4-BE49-F238E27FC236}">
-                <a16:creationId xmlns:a16="http://schemas.microsoft.com/office/drawing/2014/main" xmlns="" id="{F1DE1848-92D6-495E-9A39-57AF2583346C}"/>
+                <a16:creationId xmlns:a16="http://schemas.microsoft.com/office/drawing/2014/main" id="{F1DE1848-92D6-495E-9A39-57AF2583346C}"/>
               </a:ext>
             </a:extLst>
           </p:cNvPr>
@@ -4956,7 +5234,7 @@
           <p:cNvPr id="5" name="Picture 4">
             <a:extLst>
               <a:ext uri="{FF2B5EF4-FFF2-40B4-BE49-F238E27FC236}">
-                <a16:creationId xmlns:a16="http://schemas.microsoft.com/office/drawing/2014/main" xmlns="" id="{770388FC-8E39-4C84-997C-CE1C1A0E67D7}"/>
+                <a16:creationId xmlns:a16="http://schemas.microsoft.com/office/drawing/2014/main" id="{770388FC-8E39-4C84-997C-CE1C1A0E67D7}"/>
               </a:ext>
             </a:extLst>
           </p:cNvPr>
@@ -4985,7 +5263,7 @@
           <p:cNvPr id="6" name="Picture 5">
             <a:extLst>
               <a:ext uri="{FF2B5EF4-FFF2-40B4-BE49-F238E27FC236}">
-                <a16:creationId xmlns:a16="http://schemas.microsoft.com/office/drawing/2014/main" xmlns="" id="{738F2A17-93DA-43C1-A39C-4CF4631E4452}"/>
+                <a16:creationId xmlns:a16="http://schemas.microsoft.com/office/drawing/2014/main" id="{738F2A17-93DA-43C1-A39C-4CF4631E4452}"/>
               </a:ext>
             </a:extLst>
           </p:cNvPr>
@@ -5022,179 +5300,6 @@
 </p:sld>
 </file>
 
-<file path=ppt/slides/slide19.xml><?xml version="1.0" encoding="utf-8"?>
-<p:sld xmlns:a="http://schemas.openxmlformats.org/drawingml/2006/main" xmlns:r="http://schemas.openxmlformats.org/officeDocument/2006/relationships" xmlns:p="http://schemas.openxmlformats.org/presentationml/2006/main">
-  <p:cSld>
-    <p:spTree>
-      <p:nvGrpSpPr>
-        <p:cNvPr id="1" name=""/>
-        <p:cNvGrpSpPr/>
-        <p:nvPr/>
-      </p:nvGrpSpPr>
-      <p:grpSpPr>
-        <a:xfrm>
-          <a:off x="0" y="0"/>
-          <a:ext cx="0" cy="0"/>
-          <a:chOff x="0" y="0"/>
-          <a:chExt cx="0" cy="0"/>
-        </a:xfrm>
-      </p:grpSpPr>
-      <p:sp>
-        <p:nvSpPr>
-          <p:cNvPr id="2" name="Title 1">
-            <a:extLst>
-              <a:ext uri="{FF2B5EF4-FFF2-40B4-BE49-F238E27FC236}">
-                <a16:creationId xmlns:a16="http://schemas.microsoft.com/office/drawing/2014/main" xmlns="" id="{8FA0F58A-27F4-4925-9897-2833D2A0F5F3}"/>
-              </a:ext>
-            </a:extLst>
-          </p:cNvPr>
-          <p:cNvSpPr>
-            <a:spLocks noGrp="1"/>
-          </p:cNvSpPr>
-          <p:nvPr>
-            <p:ph type="title"/>
-          </p:nvPr>
-        </p:nvSpPr>
-        <p:spPr/>
-        <p:txBody>
-          <a:bodyPr/>
-          <a:lstStyle/>
-          <a:p>
-            <a:r>
-              <a:rPr lang="en-US" dirty="0"/>
-              <a:t>If you are starting out today…</a:t>
-            </a:r>
-          </a:p>
-        </p:txBody>
-      </p:sp>
-      <p:sp>
-        <p:nvSpPr>
-          <p:cNvPr id="4" name="Footer Placeholder 3">
-            <a:extLst>
-              <a:ext uri="{FF2B5EF4-FFF2-40B4-BE49-F238E27FC236}">
-                <a16:creationId xmlns:a16="http://schemas.microsoft.com/office/drawing/2014/main" xmlns="" id="{AF98A2DE-E26C-4450-BEE0-0D3DB6986B27}"/>
-              </a:ext>
-            </a:extLst>
-          </p:cNvPr>
-          <p:cNvSpPr>
-            <a:spLocks noGrp="1"/>
-          </p:cNvSpPr>
-          <p:nvPr>
-            <p:ph type="ftr" sz="quarter" idx="11"/>
-          </p:nvPr>
-        </p:nvSpPr>
-        <p:spPr/>
-        <p:txBody>
-          <a:bodyPr/>
-          <a:lstStyle/>
-          <a:p>
-            <a:r>
-              <a:rPr lang="en-US"/>
-              <a:t>https://github.com/pgurazada</a:t>
-            </a:r>
-          </a:p>
-        </p:txBody>
-      </p:sp>
-      <p:pic>
-        <p:nvPicPr>
-          <p:cNvPr id="7" name="Picture 6">
-            <a:extLst>
-              <a:ext uri="{FF2B5EF4-FFF2-40B4-BE49-F238E27FC236}">
-                <a16:creationId xmlns:a16="http://schemas.microsoft.com/office/drawing/2014/main" xmlns="" id="{4D39311E-5307-462A-AF8E-27010F17EA67}"/>
-              </a:ext>
-            </a:extLst>
-          </p:cNvPr>
-          <p:cNvPicPr>
-            <a:picLocks noChangeAspect="1"/>
-          </p:cNvPicPr>
-          <p:nvPr/>
-        </p:nvPicPr>
-        <p:blipFill rotWithShape="1">
-          <a:blip r:embed="rId2"/>
-          <a:srcRect l="21116" t="10853" r="22577" b="72729"/>
-          <a:stretch/>
-        </p:blipFill>
-        <p:spPr>
-          <a:xfrm>
-            <a:off x="1262422" y="2678061"/>
-            <a:ext cx="4156853" cy="681451"/>
-          </a:xfrm>
-          <a:prstGeom prst="rect">
-            <a:avLst/>
-          </a:prstGeom>
-        </p:spPr>
-      </p:pic>
-      <p:pic>
-        <p:nvPicPr>
-          <p:cNvPr id="8" name="Picture 7">
-            <a:extLst>
-              <a:ext uri="{FF2B5EF4-FFF2-40B4-BE49-F238E27FC236}">
-                <a16:creationId xmlns:a16="http://schemas.microsoft.com/office/drawing/2014/main" xmlns="" id="{293AE0BB-BCE5-437B-B4A1-E145BB1A1101}"/>
-              </a:ext>
-            </a:extLst>
-          </p:cNvPr>
-          <p:cNvPicPr>
-            <a:picLocks noChangeAspect="1"/>
-          </p:cNvPicPr>
-          <p:nvPr/>
-        </p:nvPicPr>
-        <p:blipFill rotWithShape="1">
-          <a:blip r:embed="rId3"/>
-          <a:srcRect l="20761" t="8676" r="53913" b="75359"/>
-          <a:stretch/>
-        </p:blipFill>
-        <p:spPr>
-          <a:xfrm>
-            <a:off x="7660621" y="2612611"/>
-            <a:ext cx="3087758" cy="1094340"/>
-          </a:xfrm>
-          <a:prstGeom prst="rect">
-            <a:avLst/>
-          </a:prstGeom>
-        </p:spPr>
-      </p:pic>
-      <p:pic>
-        <p:nvPicPr>
-          <p:cNvPr id="9" name="Picture 8">
-            <a:extLst>
-              <a:ext uri="{FF2B5EF4-FFF2-40B4-BE49-F238E27FC236}">
-                <a16:creationId xmlns:a16="http://schemas.microsoft.com/office/drawing/2014/main" xmlns="" id="{BF7E4813-AE1E-489C-BEAA-0BA75A25C964}"/>
-              </a:ext>
-            </a:extLst>
-          </p:cNvPr>
-          <p:cNvPicPr>
-            <a:picLocks noChangeAspect="1"/>
-          </p:cNvPicPr>
-          <p:nvPr/>
-        </p:nvPicPr>
-        <p:blipFill rotWithShape="1">
-          <a:blip r:embed="rId4"/>
-          <a:srcRect t="8869" r="56739" b="75360"/>
-          <a:stretch/>
-        </p:blipFill>
-        <p:spPr>
-          <a:xfrm>
-            <a:off x="3340849" y="4736790"/>
-            <a:ext cx="5274365" cy="1081088"/>
-          </a:xfrm>
-          <a:prstGeom prst="rect">
-            <a:avLst/>
-          </a:prstGeom>
-        </p:spPr>
-      </p:pic>
-    </p:spTree>
-    <p:extLst>
-      <p:ext uri="{BB962C8B-B14F-4D97-AF65-F5344CB8AC3E}">
-        <p14:creationId xmlns:p14="http://schemas.microsoft.com/office/powerpoint/2010/main" val="2624163330"/>
-      </p:ext>
-    </p:extLst>
-  </p:cSld>
-  <p:clrMapOvr>
-    <a:masterClrMapping/>
-  </p:clrMapOvr>
-</p:sld>
-</file>
-
 <file path=ppt/slides/slide2.xml><?xml version="1.0" encoding="utf-8"?>
 <p:sld xmlns:a="http://schemas.openxmlformats.org/drawingml/2006/main" xmlns:r="http://schemas.openxmlformats.org/officeDocument/2006/relationships" xmlns:p="http://schemas.openxmlformats.org/presentationml/2006/main">
   <p:cSld>
@@ -5217,7 +5322,7 @@
           <p:cNvPr id="2" name="Title 1">
             <a:extLst>
               <a:ext uri="{FF2B5EF4-FFF2-40B4-BE49-F238E27FC236}">
-                <a16:creationId xmlns:a16="http://schemas.microsoft.com/office/drawing/2014/main" xmlns="" id="{0E75941F-7E46-4099-9754-86A5D3D27F64}"/>
+                <a16:creationId xmlns:a16="http://schemas.microsoft.com/office/drawing/2014/main" id="{0E75941F-7E46-4099-9754-86A5D3D27F64}"/>
               </a:ext>
             </a:extLst>
           </p:cNvPr>
@@ -5247,7 +5352,7 @@
               <p:cNvPr id="3" name="Content Placeholder 2">
                 <a:extLst>
                   <a:ext uri="{FF2B5EF4-FFF2-40B4-BE49-F238E27FC236}">
-                    <a16:creationId xmlns:a16="http://schemas.microsoft.com/office/drawing/2014/main" xmlns="" id="{8AA38EA6-C309-4325-B8AE-8BBD1D49BD28}"/>
+                    <a16:creationId xmlns:a16="http://schemas.microsoft.com/office/drawing/2014/main" id="{8AA38EA6-C309-4325-B8AE-8BBD1D49BD28}"/>
                   </a:ext>
                 </a:extLst>
               </p:cNvPr>
@@ -5366,7 +5471,7 @@
           <p:cNvPr id="4" name="Footer Placeholder 3">
             <a:extLst>
               <a:ext uri="{FF2B5EF4-FFF2-40B4-BE49-F238E27FC236}">
-                <a16:creationId xmlns:a16="http://schemas.microsoft.com/office/drawing/2014/main" xmlns="" id="{51C297E8-6E86-48C1-858B-B538D6123347}"/>
+                <a16:creationId xmlns:a16="http://schemas.microsoft.com/office/drawing/2014/main" id="{51C297E8-6E86-48C1-858B-B538D6123347}"/>
               </a:ext>
             </a:extLst>
           </p:cNvPr>
@@ -5403,6 +5508,179 @@
 </file>
 
 <file path=ppt/slides/slide20.xml><?xml version="1.0" encoding="utf-8"?>
+<p:sld xmlns:a="http://schemas.openxmlformats.org/drawingml/2006/main" xmlns:r="http://schemas.openxmlformats.org/officeDocument/2006/relationships" xmlns:p="http://schemas.openxmlformats.org/presentationml/2006/main">
+  <p:cSld>
+    <p:spTree>
+      <p:nvGrpSpPr>
+        <p:cNvPr id="1" name=""/>
+        <p:cNvGrpSpPr/>
+        <p:nvPr/>
+      </p:nvGrpSpPr>
+      <p:grpSpPr>
+        <a:xfrm>
+          <a:off x="0" y="0"/>
+          <a:ext cx="0" cy="0"/>
+          <a:chOff x="0" y="0"/>
+          <a:chExt cx="0" cy="0"/>
+        </a:xfrm>
+      </p:grpSpPr>
+      <p:sp>
+        <p:nvSpPr>
+          <p:cNvPr id="2" name="Title 1">
+            <a:extLst>
+              <a:ext uri="{FF2B5EF4-FFF2-40B4-BE49-F238E27FC236}">
+                <a16:creationId xmlns:a16="http://schemas.microsoft.com/office/drawing/2014/main" id="{8FA0F58A-27F4-4925-9897-2833D2A0F5F3}"/>
+              </a:ext>
+            </a:extLst>
+          </p:cNvPr>
+          <p:cNvSpPr>
+            <a:spLocks noGrp="1"/>
+          </p:cNvSpPr>
+          <p:nvPr>
+            <p:ph type="title"/>
+          </p:nvPr>
+        </p:nvSpPr>
+        <p:spPr/>
+        <p:txBody>
+          <a:bodyPr/>
+          <a:lstStyle/>
+          <a:p>
+            <a:r>
+              <a:rPr lang="en-US" dirty="0"/>
+              <a:t>If you are starting out today…</a:t>
+            </a:r>
+          </a:p>
+        </p:txBody>
+      </p:sp>
+      <p:sp>
+        <p:nvSpPr>
+          <p:cNvPr id="4" name="Footer Placeholder 3">
+            <a:extLst>
+              <a:ext uri="{FF2B5EF4-FFF2-40B4-BE49-F238E27FC236}">
+                <a16:creationId xmlns:a16="http://schemas.microsoft.com/office/drawing/2014/main" id="{AF98A2DE-E26C-4450-BEE0-0D3DB6986B27}"/>
+              </a:ext>
+            </a:extLst>
+          </p:cNvPr>
+          <p:cNvSpPr>
+            <a:spLocks noGrp="1"/>
+          </p:cNvSpPr>
+          <p:nvPr>
+            <p:ph type="ftr" sz="quarter" idx="11"/>
+          </p:nvPr>
+        </p:nvSpPr>
+        <p:spPr/>
+        <p:txBody>
+          <a:bodyPr/>
+          <a:lstStyle/>
+          <a:p>
+            <a:r>
+              <a:rPr lang="en-US"/>
+              <a:t>https://github.com/pgurazada</a:t>
+            </a:r>
+          </a:p>
+        </p:txBody>
+      </p:sp>
+      <p:pic>
+        <p:nvPicPr>
+          <p:cNvPr id="7" name="Picture 6">
+            <a:extLst>
+              <a:ext uri="{FF2B5EF4-FFF2-40B4-BE49-F238E27FC236}">
+                <a16:creationId xmlns:a16="http://schemas.microsoft.com/office/drawing/2014/main" id="{4D39311E-5307-462A-AF8E-27010F17EA67}"/>
+              </a:ext>
+            </a:extLst>
+          </p:cNvPr>
+          <p:cNvPicPr>
+            <a:picLocks noChangeAspect="1"/>
+          </p:cNvPicPr>
+          <p:nvPr/>
+        </p:nvPicPr>
+        <p:blipFill rotWithShape="1">
+          <a:blip r:embed="rId2"/>
+          <a:srcRect l="21116" t="10853" r="22577" b="72729"/>
+          <a:stretch/>
+        </p:blipFill>
+        <p:spPr>
+          <a:xfrm>
+            <a:off x="1262422" y="2678061"/>
+            <a:ext cx="4156853" cy="681451"/>
+          </a:xfrm>
+          <a:prstGeom prst="rect">
+            <a:avLst/>
+          </a:prstGeom>
+        </p:spPr>
+      </p:pic>
+      <p:pic>
+        <p:nvPicPr>
+          <p:cNvPr id="8" name="Picture 7">
+            <a:extLst>
+              <a:ext uri="{FF2B5EF4-FFF2-40B4-BE49-F238E27FC236}">
+                <a16:creationId xmlns:a16="http://schemas.microsoft.com/office/drawing/2014/main" id="{293AE0BB-BCE5-437B-B4A1-E145BB1A1101}"/>
+              </a:ext>
+            </a:extLst>
+          </p:cNvPr>
+          <p:cNvPicPr>
+            <a:picLocks noChangeAspect="1"/>
+          </p:cNvPicPr>
+          <p:nvPr/>
+        </p:nvPicPr>
+        <p:blipFill rotWithShape="1">
+          <a:blip r:embed="rId3"/>
+          <a:srcRect l="20761" t="8676" r="53913" b="75359"/>
+          <a:stretch/>
+        </p:blipFill>
+        <p:spPr>
+          <a:xfrm>
+            <a:off x="7660621" y="2612611"/>
+            <a:ext cx="3087758" cy="1094340"/>
+          </a:xfrm>
+          <a:prstGeom prst="rect">
+            <a:avLst/>
+          </a:prstGeom>
+        </p:spPr>
+      </p:pic>
+      <p:pic>
+        <p:nvPicPr>
+          <p:cNvPr id="9" name="Picture 8">
+            <a:extLst>
+              <a:ext uri="{FF2B5EF4-FFF2-40B4-BE49-F238E27FC236}">
+                <a16:creationId xmlns:a16="http://schemas.microsoft.com/office/drawing/2014/main" id="{BF7E4813-AE1E-489C-BEAA-0BA75A25C964}"/>
+              </a:ext>
+            </a:extLst>
+          </p:cNvPr>
+          <p:cNvPicPr>
+            <a:picLocks noChangeAspect="1"/>
+          </p:cNvPicPr>
+          <p:nvPr/>
+        </p:nvPicPr>
+        <p:blipFill rotWithShape="1">
+          <a:blip r:embed="rId4"/>
+          <a:srcRect t="8869" r="56739" b="75360"/>
+          <a:stretch/>
+        </p:blipFill>
+        <p:spPr>
+          <a:xfrm>
+            <a:off x="3340849" y="4736790"/>
+            <a:ext cx="5274365" cy="1081088"/>
+          </a:xfrm>
+          <a:prstGeom prst="rect">
+            <a:avLst/>
+          </a:prstGeom>
+        </p:spPr>
+      </p:pic>
+    </p:spTree>
+    <p:extLst>
+      <p:ext uri="{BB962C8B-B14F-4D97-AF65-F5344CB8AC3E}">
+        <p14:creationId xmlns:p14="http://schemas.microsoft.com/office/powerpoint/2010/main" val="2624163330"/>
+      </p:ext>
+    </p:extLst>
+  </p:cSld>
+  <p:clrMapOvr>
+    <a:masterClrMapping/>
+  </p:clrMapOvr>
+</p:sld>
+</file>
+
+<file path=ppt/slides/slide21.xml><?xml version="1.0" encoding="utf-8"?>
 <p:sld xmlns:a="http://schemas.openxmlformats.org/drawingml/2006/main" xmlns:r="http://schemas.openxmlformats.org/officeDocument/2006/relationships" xmlns:p="http://schemas.openxmlformats.org/presentationml/2006/main">
   <p:cSld>
     <p:spTree>
@@ -5726,7 +6004,7 @@
             <a:pPr algn="ctr"/>
             <a:r>
               <a:rPr lang="en-US" dirty="0"/>
-              <a:t>This is a highly opinionated talk!</a:t>
+              <a:t>This is a highly opinionated talk…</a:t>
             </a:r>
           </a:p>
         </p:txBody>
@@ -6257,7 +6535,7 @@
           <p:cNvPr id="4" name="Footer Placeholder 3">
             <a:extLst>
               <a:ext uri="{FF2B5EF4-FFF2-40B4-BE49-F238E27FC236}">
-                <a16:creationId xmlns:a16="http://schemas.microsoft.com/office/drawing/2014/main" xmlns="" id="{31E0DDC2-1356-43FA-A8A0-786C18D5D1DA}"/>
+                <a16:creationId xmlns:a16="http://schemas.microsoft.com/office/drawing/2014/main" id="{31E0DDC2-1356-43FA-A8A0-786C18D5D1DA}"/>
               </a:ext>
             </a:extLst>
           </p:cNvPr>
@@ -6285,7 +6563,7 @@
           <p:cNvPr id="1026" name="Picture 2" descr="Image result for wes mckinney and hadley wickham">
             <a:extLst>
               <a:ext uri="{FF2B5EF4-FFF2-40B4-BE49-F238E27FC236}">
-                <a16:creationId xmlns:a16="http://schemas.microsoft.com/office/drawing/2014/main" xmlns="" id="{3A8E87C4-09C1-4BFC-8DE7-B019DBB2FBDE}"/>
+                <a16:creationId xmlns:a16="http://schemas.microsoft.com/office/drawing/2014/main" id="{3A8E87C4-09C1-4BFC-8DE7-B019DBB2FBDE}"/>
               </a:ext>
             </a:extLst>
           </p:cNvPr>

</xml_diff>